<commit_message>
SW and HW added commit
</commit_message>
<xml_diff>
--- a/Wind Farms Designer.pptx
+++ b/Wind Farms Designer.pptx
@@ -5,7 +5,7 @@
     <p:sldMasterId id="2147483648" r:id="rId1"/>
   </p:sldMasterIdLst>
   <p:notesMasterIdLst>
-    <p:notesMasterId r:id="rId15"/>
+    <p:notesMasterId r:id="rId16"/>
   </p:notesMasterIdLst>
   <p:sldIdLst>
     <p:sldId id="259" r:id="rId2"/>
@@ -19,8 +19,9 @@
     <p:sldId id="264" r:id="rId10"/>
     <p:sldId id="265" r:id="rId11"/>
     <p:sldId id="266" r:id="rId12"/>
-    <p:sldId id="267" r:id="rId13"/>
-    <p:sldId id="268" r:id="rId14"/>
+    <p:sldId id="269" r:id="rId13"/>
+    <p:sldId id="267" r:id="rId14"/>
+    <p:sldId id="268" r:id="rId15"/>
   </p:sldIdLst>
   <p:sldSz cx="12192000" cy="6858000"/>
   <p:notesSz cx="6858000" cy="9144000"/>
@@ -209,7 +210,7 @@
           <a:p>
             <a:fld id="{00795045-5774-4CB6-95C1-1277BA9EE302}" type="datetimeFigureOut">
               <a:rPr lang="en-US" smtClean="0"/>
-              <a:t>11/10/2014</a:t>
+              <a:t>11/11/2014</a:t>
             </a:fld>
             <a:endParaRPr lang="en-US"/>
           </a:p>
@@ -889,7 +890,7 @@
           <a:p>
             <a:fld id="{FBB5C724-FB93-4F33-BB48-DEEB56A0EDC6}" type="datetimeFigureOut">
               <a:rPr lang="en-US" smtClean="0"/>
-              <a:t>11/10/2014</a:t>
+              <a:t>11/11/2014</a:t>
             </a:fld>
             <a:endParaRPr lang="en-US"/>
           </a:p>
@@ -1059,7 +1060,7 @@
           <a:p>
             <a:fld id="{FBB5C724-FB93-4F33-BB48-DEEB56A0EDC6}" type="datetimeFigureOut">
               <a:rPr lang="en-US" smtClean="0"/>
-              <a:t>11/10/2014</a:t>
+              <a:t>11/11/2014</a:t>
             </a:fld>
             <a:endParaRPr lang="en-US"/>
           </a:p>
@@ -1239,7 +1240,7 @@
           <a:p>
             <a:fld id="{FBB5C724-FB93-4F33-BB48-DEEB56A0EDC6}" type="datetimeFigureOut">
               <a:rPr lang="en-US" smtClean="0"/>
-              <a:t>11/10/2014</a:t>
+              <a:t>11/11/2014</a:t>
             </a:fld>
             <a:endParaRPr lang="en-US"/>
           </a:p>
@@ -1409,7 +1410,7 @@
           <a:p>
             <a:fld id="{FBB5C724-FB93-4F33-BB48-DEEB56A0EDC6}" type="datetimeFigureOut">
               <a:rPr lang="en-US" smtClean="0"/>
-              <a:t>11/10/2014</a:t>
+              <a:t>11/11/2014</a:t>
             </a:fld>
             <a:endParaRPr lang="en-US"/>
           </a:p>
@@ -1655,7 +1656,7 @@
           <a:p>
             <a:fld id="{FBB5C724-FB93-4F33-BB48-DEEB56A0EDC6}" type="datetimeFigureOut">
               <a:rPr lang="en-US" smtClean="0"/>
-              <a:t>11/10/2014</a:t>
+              <a:t>11/11/2014</a:t>
             </a:fld>
             <a:endParaRPr lang="en-US"/>
           </a:p>
@@ -1887,7 +1888,7 @@
           <a:p>
             <a:fld id="{FBB5C724-FB93-4F33-BB48-DEEB56A0EDC6}" type="datetimeFigureOut">
               <a:rPr lang="en-US" smtClean="0"/>
-              <a:t>11/10/2014</a:t>
+              <a:t>11/11/2014</a:t>
             </a:fld>
             <a:endParaRPr lang="en-US"/>
           </a:p>
@@ -2254,7 +2255,7 @@
           <a:p>
             <a:fld id="{FBB5C724-FB93-4F33-BB48-DEEB56A0EDC6}" type="datetimeFigureOut">
               <a:rPr lang="en-US" smtClean="0"/>
-              <a:t>11/10/2014</a:t>
+              <a:t>11/11/2014</a:t>
             </a:fld>
             <a:endParaRPr lang="en-US"/>
           </a:p>
@@ -2372,7 +2373,7 @@
           <a:p>
             <a:fld id="{FBB5C724-FB93-4F33-BB48-DEEB56A0EDC6}" type="datetimeFigureOut">
               <a:rPr lang="en-US" smtClean="0"/>
-              <a:t>11/10/2014</a:t>
+              <a:t>11/11/2014</a:t>
             </a:fld>
             <a:endParaRPr lang="en-US"/>
           </a:p>
@@ -2467,7 +2468,7 @@
           <a:p>
             <a:fld id="{FBB5C724-FB93-4F33-BB48-DEEB56A0EDC6}" type="datetimeFigureOut">
               <a:rPr lang="en-US" smtClean="0"/>
-              <a:t>11/10/2014</a:t>
+              <a:t>11/11/2014</a:t>
             </a:fld>
             <a:endParaRPr lang="en-US"/>
           </a:p>
@@ -2744,7 +2745,7 @@
           <a:p>
             <a:fld id="{FBB5C724-FB93-4F33-BB48-DEEB56A0EDC6}" type="datetimeFigureOut">
               <a:rPr lang="en-US" smtClean="0"/>
-              <a:t>11/10/2014</a:t>
+              <a:t>11/11/2014</a:t>
             </a:fld>
             <a:endParaRPr lang="en-US"/>
           </a:p>
@@ -2997,7 +2998,7 @@
           <a:p>
             <a:fld id="{FBB5C724-FB93-4F33-BB48-DEEB56A0EDC6}" type="datetimeFigureOut">
               <a:rPr lang="en-US" smtClean="0"/>
-              <a:t>11/10/2014</a:t>
+              <a:t>11/11/2014</a:t>
             </a:fld>
             <a:endParaRPr lang="en-US"/>
           </a:p>
@@ -3210,7 +3211,7 @@
           <a:p>
             <a:fld id="{FBB5C724-FB93-4F33-BB48-DEEB56A0EDC6}" type="datetimeFigureOut">
               <a:rPr lang="en-US" smtClean="0"/>
-              <a:t>11/10/2014</a:t>
+              <a:t>11/11/2014</a:t>
             </a:fld>
             <a:endParaRPr lang="en-US"/>
           </a:p>
@@ -3955,6 +3956,200 @@
         <p:spPr>
           <a:xfrm>
             <a:off x="838200" y="365125"/>
+            <a:ext cx="10515600" cy="762635"/>
+          </a:xfrm>
+        </p:spPr>
+        <p:txBody>
+          <a:bodyPr>
+            <a:normAutofit fontScale="90000"/>
+          </a:bodyPr>
+          <a:lstStyle/>
+          <a:p>
+            <a:pPr algn="ctr"/>
+            <a:r>
+              <a:rPr lang="en-US" b="1" dirty="0" smtClean="0"/>
+              <a:t>Software </a:t>
+            </a:r>
+            <a:r>
+              <a:rPr lang="en-US" b="1" dirty="0"/>
+              <a:t>&amp; Hardware Tools.</a:t>
+            </a:r>
+            <a:r>
+              <a:rPr lang="en-US" dirty="0"/>
+              <a:t/>
+            </a:r>
+            <a:br>
+              <a:rPr lang="en-US" dirty="0"/>
+            </a:br>
+            <a:endParaRPr lang="en-US" dirty="0"/>
+          </a:p>
+        </p:txBody>
+      </p:sp>
+      <p:sp>
+        <p:nvSpPr>
+          <p:cNvPr id="3" name="Content Placeholder 2"/>
+          <p:cNvSpPr>
+            <a:spLocks noGrp="1"/>
+          </p:cNvSpPr>
+          <p:nvPr>
+            <p:ph idx="1"/>
+          </p:nvPr>
+        </p:nvSpPr>
+        <p:spPr>
+          <a:xfrm>
+            <a:off x="838200" y="975360"/>
+            <a:ext cx="10515600" cy="5379720"/>
+          </a:xfrm>
+        </p:spPr>
+        <p:txBody>
+          <a:bodyPr/>
+          <a:lstStyle/>
+          <a:p>
+            <a:r>
+              <a:rPr lang="en-US" dirty="0"/>
+              <a:t>Software</a:t>
+            </a:r>
+          </a:p>
+          <a:p>
+            <a:pPr marL="0" indent="0">
+              <a:buNone/>
+            </a:pPr>
+            <a:r>
+              <a:rPr lang="en-US" dirty="0" smtClean="0"/>
+              <a:t>	ODBC</a:t>
+            </a:r>
+            <a:endParaRPr lang="en-US" dirty="0"/>
+          </a:p>
+          <a:p>
+            <a:pPr marL="0" indent="0">
+              <a:buNone/>
+            </a:pPr>
+            <a:r>
+              <a:rPr lang="en-US" dirty="0" smtClean="0"/>
+              <a:t>	database </a:t>
+            </a:r>
+            <a:r>
+              <a:rPr lang="en-US" dirty="0"/>
+              <a:t>servers</a:t>
+            </a:r>
+          </a:p>
+          <a:p>
+            <a:endParaRPr lang="en-US" dirty="0" smtClean="0"/>
+          </a:p>
+          <a:p>
+            <a:r>
+              <a:rPr lang="en-US" dirty="0"/>
+              <a:t>online functionality</a:t>
+            </a:r>
+          </a:p>
+          <a:p>
+            <a:pPr marL="0" indent="0">
+              <a:buNone/>
+            </a:pPr>
+            <a:r>
+              <a:rPr lang="en-US" dirty="0" smtClean="0"/>
+              <a:t>	map </a:t>
+            </a:r>
+            <a:r>
+              <a:rPr lang="en-US" dirty="0"/>
+              <a:t>within GPS</a:t>
+            </a:r>
+          </a:p>
+          <a:p>
+            <a:endParaRPr lang="en-US" dirty="0"/>
+          </a:p>
+          <a:p>
+            <a:r>
+              <a:rPr lang="en-US" dirty="0"/>
+              <a:t>hardware </a:t>
+            </a:r>
+          </a:p>
+          <a:p>
+            <a:r>
+              <a:rPr lang="en-US" dirty="0"/>
+              <a:t>Processor, </a:t>
+            </a:r>
+            <a:r>
+              <a:rPr lang="en-US" dirty="0" err="1"/>
+              <a:t>Memory,Graphics</a:t>
+            </a:r>
+            <a:r>
+              <a:rPr lang="en-US" dirty="0"/>
+              <a:t> and </a:t>
+            </a:r>
+            <a:r>
+              <a:rPr lang="en-US" dirty="0" smtClean="0"/>
+              <a:t>Screen</a:t>
+            </a:r>
+            <a:br>
+              <a:rPr lang="en-US" dirty="0" smtClean="0"/>
+            </a:br>
+            <a:r>
+              <a:rPr lang="en-US" dirty="0" smtClean="0"/>
+              <a:t> </a:t>
+            </a:r>
+            <a:r>
+              <a:rPr lang="en-US" dirty="0" err="1"/>
+              <a:t>Resolution,Disk</a:t>
+            </a:r>
+            <a:r>
+              <a:rPr lang="en-US" dirty="0"/>
+              <a:t> </a:t>
+            </a:r>
+            <a:r>
+              <a:rPr lang="en-US" dirty="0" err="1"/>
+              <a:t>space,ports</a:t>
+            </a:r>
+            <a:r>
+              <a:rPr lang="en-US" dirty="0"/>
+              <a:t> (computer)</a:t>
+            </a:r>
+          </a:p>
+        </p:txBody>
+      </p:sp>
+    </p:spTree>
+    <p:extLst>
+      <p:ext uri="{BB962C8B-B14F-4D97-AF65-F5344CB8AC3E}">
+        <p14:creationId xmlns:p14="http://schemas.microsoft.com/office/powerpoint/2010/main" val="4192888494"/>
+      </p:ext>
+    </p:extLst>
+  </p:cSld>
+  <p:clrMapOvr>
+    <a:masterClrMapping/>
+  </p:clrMapOvr>
+</p:sld>
+</file>
+
+<file path=ppt/slides/slide13.xml><?xml version="1.0" encoding="utf-8"?>
+<p:sld xmlns:a="http://schemas.openxmlformats.org/drawingml/2006/main" xmlns:r="http://schemas.openxmlformats.org/officeDocument/2006/relationships" xmlns:p="http://schemas.openxmlformats.org/presentationml/2006/main">
+  <p:cSld>
+    <p:spTree>
+      <p:nvGrpSpPr>
+        <p:cNvPr id="1" name=""/>
+        <p:cNvGrpSpPr/>
+        <p:nvPr/>
+      </p:nvGrpSpPr>
+      <p:grpSpPr>
+        <a:xfrm>
+          <a:off x="0" y="0"/>
+          <a:ext cx="0" cy="0"/>
+          <a:chOff x="0" y="0"/>
+          <a:chExt cx="0" cy="0"/>
+        </a:xfrm>
+      </p:grpSpPr>
+      <p:sp>
+        <p:nvSpPr>
+          <p:cNvPr id="2" name="Title 1"/>
+          <p:cNvSpPr>
+            <a:spLocks noGrp="1"/>
+          </p:cNvSpPr>
+          <p:nvPr>
+            <p:ph type="title"/>
+          </p:nvPr>
+        </p:nvSpPr>
+        <p:spPr>
+          <a:xfrm>
+            <a:off x="838200" y="365125"/>
             <a:ext cx="10515600" cy="777875"/>
           </a:xfrm>
         </p:spPr>
@@ -4020,7 +4215,7 @@
 </p:sld>
 </file>
 
-<file path=ppt/slides/slide13.xml><?xml version="1.0" encoding="utf-8"?>
+<file path=ppt/slides/slide14.xml><?xml version="1.0" encoding="utf-8"?>
 <p:sld xmlns:a="http://schemas.openxmlformats.org/drawingml/2006/main" xmlns:r="http://schemas.openxmlformats.org/officeDocument/2006/relationships" xmlns:p="http://schemas.openxmlformats.org/presentationml/2006/main">
   <p:cSld>
     <p:spTree>
@@ -5135,13 +5330,8 @@
             </a:pPr>
             <a:r>
               <a:rPr lang="en-US" dirty="0" smtClean="0"/>
-              <a:t>problems </a:t>
-            </a:r>
-            <a:r>
-              <a:rPr lang="en-US" dirty="0" smtClean="0"/>
-              <a:t>of :</a:t>
-            </a:r>
-            <a:endParaRPr lang="en-US" dirty="0" smtClean="0"/>
+              <a:t>problems of :</a:t>
+            </a:r>
           </a:p>
           <a:p>
             <a:pPr marL="0" indent="0">
@@ -5174,11 +5364,7 @@
             </a:r>
             <a:r>
               <a:rPr lang="en-US" dirty="0" smtClean="0"/>
-              <a:t>turbines </a:t>
-            </a:r>
-            <a:r>
-              <a:rPr lang="en-US" dirty="0" smtClean="0"/>
-              <a:t>to make </a:t>
+              <a:t>turbines to make </a:t>
             </a:r>
           </a:p>
           <a:p>

</xml_diff>